<commit_message>
chg: updated conceptual figure
</commit_message>
<xml_diff>
--- a/img/use_case.pptx
+++ b/img/use_case.pptx
@@ -272,7 +272,7 @@
           <a:p>
             <a:fld id="{54EDF047-B26A-6145-81CD-830EBDA6931A}" type="datetimeFigureOut">
               <a:rPr lang="en-US" smtClean="0"/>
-              <a:t>3/19/22</a:t>
+              <a:t>3/20/22</a:t>
             </a:fld>
             <a:endParaRPr lang="en-US"/>
           </a:p>
@@ -472,7 +472,7 @@
           <a:p>
             <a:fld id="{54EDF047-B26A-6145-81CD-830EBDA6931A}" type="datetimeFigureOut">
               <a:rPr lang="en-US" smtClean="0"/>
-              <a:t>3/19/22</a:t>
+              <a:t>3/20/22</a:t>
             </a:fld>
             <a:endParaRPr lang="en-US"/>
           </a:p>
@@ -682,7 +682,7 @@
           <a:p>
             <a:fld id="{54EDF047-B26A-6145-81CD-830EBDA6931A}" type="datetimeFigureOut">
               <a:rPr lang="en-US" smtClean="0"/>
-              <a:t>3/19/22</a:t>
+              <a:t>3/20/22</a:t>
             </a:fld>
             <a:endParaRPr lang="en-US"/>
           </a:p>
@@ -882,7 +882,7 @@
           <a:p>
             <a:fld id="{54EDF047-B26A-6145-81CD-830EBDA6931A}" type="datetimeFigureOut">
               <a:rPr lang="en-US" smtClean="0"/>
-              <a:t>3/19/22</a:t>
+              <a:t>3/20/22</a:t>
             </a:fld>
             <a:endParaRPr lang="en-US"/>
           </a:p>
@@ -1158,7 +1158,7 @@
           <a:p>
             <a:fld id="{54EDF047-B26A-6145-81CD-830EBDA6931A}" type="datetimeFigureOut">
               <a:rPr lang="en-US" smtClean="0"/>
-              <a:t>3/19/22</a:t>
+              <a:t>3/20/22</a:t>
             </a:fld>
             <a:endParaRPr lang="en-US"/>
           </a:p>
@@ -1426,7 +1426,7 @@
           <a:p>
             <a:fld id="{54EDF047-B26A-6145-81CD-830EBDA6931A}" type="datetimeFigureOut">
               <a:rPr lang="en-US" smtClean="0"/>
-              <a:t>3/19/22</a:t>
+              <a:t>3/20/22</a:t>
             </a:fld>
             <a:endParaRPr lang="en-US"/>
           </a:p>
@@ -1841,7 +1841,7 @@
           <a:p>
             <a:fld id="{54EDF047-B26A-6145-81CD-830EBDA6931A}" type="datetimeFigureOut">
               <a:rPr lang="en-US" smtClean="0"/>
-              <a:t>3/19/22</a:t>
+              <a:t>3/20/22</a:t>
             </a:fld>
             <a:endParaRPr lang="en-US"/>
           </a:p>
@@ -1983,7 +1983,7 @@
           <a:p>
             <a:fld id="{54EDF047-B26A-6145-81CD-830EBDA6931A}" type="datetimeFigureOut">
               <a:rPr lang="en-US" smtClean="0"/>
-              <a:t>3/19/22</a:t>
+              <a:t>3/20/22</a:t>
             </a:fld>
             <a:endParaRPr lang="en-US"/>
           </a:p>
@@ -2096,7 +2096,7 @@
           <a:p>
             <a:fld id="{54EDF047-B26A-6145-81CD-830EBDA6931A}" type="datetimeFigureOut">
               <a:rPr lang="en-US" smtClean="0"/>
-              <a:t>3/19/22</a:t>
+              <a:t>3/20/22</a:t>
             </a:fld>
             <a:endParaRPr lang="en-US"/>
           </a:p>
@@ -2409,7 +2409,7 @@
           <a:p>
             <a:fld id="{54EDF047-B26A-6145-81CD-830EBDA6931A}" type="datetimeFigureOut">
               <a:rPr lang="en-US" smtClean="0"/>
-              <a:t>3/19/22</a:t>
+              <a:t>3/20/22</a:t>
             </a:fld>
             <a:endParaRPr lang="en-US"/>
           </a:p>
@@ -2698,7 +2698,7 @@
           <a:p>
             <a:fld id="{54EDF047-B26A-6145-81CD-830EBDA6931A}" type="datetimeFigureOut">
               <a:rPr lang="en-US" smtClean="0"/>
-              <a:t>3/19/22</a:t>
+              <a:t>3/20/22</a:t>
             </a:fld>
             <a:endParaRPr lang="en-US"/>
           </a:p>
@@ -2941,7 +2941,7 @@
           <a:p>
             <a:fld id="{54EDF047-B26A-6145-81CD-830EBDA6931A}" type="datetimeFigureOut">
               <a:rPr lang="en-US" smtClean="0"/>
-              <a:t>3/19/22</a:t>
+              <a:t>3/20/22</a:t>
             </a:fld>
             <a:endParaRPr lang="en-US"/>
           </a:p>
@@ -4183,7 +4183,7 @@
         </p:nvSpPr>
         <p:spPr>
           <a:xfrm>
-            <a:off x="2425148" y="3950341"/>
+            <a:off x="2425148" y="3950340"/>
             <a:ext cx="476098" cy="240632"/>
           </a:xfrm>
           <a:prstGeom prst="roundRect">
@@ -4237,7 +4237,7 @@
         </p:nvSpPr>
         <p:spPr>
           <a:xfrm>
-            <a:off x="2578001" y="3949377"/>
+            <a:off x="2578001" y="3949376"/>
             <a:ext cx="386400" cy="246221"/>
           </a:xfrm>
           <a:prstGeom prst="rect">
@@ -4285,7 +4285,7 @@
         </p:blipFill>
         <p:spPr>
           <a:xfrm>
-            <a:off x="2491809" y="4011256"/>
+            <a:off x="2491809" y="4011255"/>
             <a:ext cx="137092" cy="120547"/>
           </a:xfrm>
           <a:prstGeom prst="rect">
@@ -4293,6 +4293,50 @@
           </a:prstGeom>
         </p:spPr>
       </p:pic>
+      <p:sp>
+        <p:nvSpPr>
+          <p:cNvPr id="24" name="TextBox 23">
+            <a:extLst>
+              <a:ext uri="{FF2B5EF4-FFF2-40B4-BE49-F238E27FC236}">
+                <a16:creationId xmlns:a16="http://schemas.microsoft.com/office/drawing/2014/main" id="{7CED1E53-2C88-034A-9CB6-AB4EA9D39DF4}"/>
+              </a:ext>
+            </a:extLst>
+          </p:cNvPr>
+          <p:cNvSpPr txBox="1"/>
+          <p:nvPr/>
+        </p:nvSpPr>
+        <p:spPr>
+          <a:xfrm>
+            <a:off x="2132340" y="4179499"/>
+            <a:ext cx="1079548" cy="169277"/>
+          </a:xfrm>
+          <a:prstGeom prst="rect">
+            <a:avLst/>
+          </a:prstGeom>
+          <a:noFill/>
+        </p:spPr>
+        <p:txBody>
+          <a:bodyPr wrap="square" rtlCol="0">
+            <a:spAutoFit/>
+          </a:bodyPr>
+          <a:lstStyle/>
+          <a:p>
+            <a:pPr algn="ctr"/>
+            <a:r>
+              <a:rPr lang="en-US" sz="500" b="1" cap="small" dirty="0">
+                <a:solidFill>
+                  <a:schemeClr val="tx1">
+                    <a:lumMod val="75000"/>
+                    <a:lumOff val="25000"/>
+                  </a:schemeClr>
+                </a:solidFill>
+                <a:latin typeface="Avenir Book" panose="02000503020000020003" pitchFamily="2" charset="0"/>
+              </a:rPr>
+              <a:t>DEPLOYMENT RISK</a:t>
+            </a:r>
+          </a:p>
+        </p:txBody>
+      </p:sp>
     </p:spTree>
     <p:extLst>
       <p:ext uri="{BB962C8B-B14F-4D97-AF65-F5344CB8AC3E}">

</xml_diff>